<commit_message>
fixed assignment system and field layout diagram
</commit_message>
<xml_diff>
--- a/scout/assets/fieldpowerpoint.pptx
+++ b/scout/assets/fieldpowerpoint.pptx
@@ -238,7 +238,7 @@
           <a:p>
             <a:fld id="{AA480DD2-C9B7-48D0-9853-63B121350BCC}" type="datetimeFigureOut">
               <a:rPr lang="en-US" smtClean="0"/>
-              <a:t>2/23/2014</a:t>
+              <a:t>4/3/14</a:t>
             </a:fld>
             <a:endParaRPr lang="en-US"/>
           </a:p>
@@ -408,7 +408,7 @@
           <a:p>
             <a:fld id="{AA480DD2-C9B7-48D0-9853-63B121350BCC}" type="datetimeFigureOut">
               <a:rPr lang="en-US" smtClean="0"/>
-              <a:t>2/23/2014</a:t>
+              <a:t>4/3/14</a:t>
             </a:fld>
             <a:endParaRPr lang="en-US"/>
           </a:p>
@@ -588,7 +588,7 @@
           <a:p>
             <a:fld id="{AA480DD2-C9B7-48D0-9853-63B121350BCC}" type="datetimeFigureOut">
               <a:rPr lang="en-US" smtClean="0"/>
-              <a:t>2/23/2014</a:t>
+              <a:t>4/3/14</a:t>
             </a:fld>
             <a:endParaRPr lang="en-US"/>
           </a:p>
@@ -758,7 +758,7 @@
           <a:p>
             <a:fld id="{AA480DD2-C9B7-48D0-9853-63B121350BCC}" type="datetimeFigureOut">
               <a:rPr lang="en-US" smtClean="0"/>
-              <a:t>2/23/2014</a:t>
+              <a:t>4/3/14</a:t>
             </a:fld>
             <a:endParaRPr lang="en-US"/>
           </a:p>
@@ -1004,7 +1004,7 @@
           <a:p>
             <a:fld id="{AA480DD2-C9B7-48D0-9853-63B121350BCC}" type="datetimeFigureOut">
               <a:rPr lang="en-US" smtClean="0"/>
-              <a:t>2/23/2014</a:t>
+              <a:t>4/3/14</a:t>
             </a:fld>
             <a:endParaRPr lang="en-US"/>
           </a:p>
@@ -1236,7 +1236,7 @@
           <a:p>
             <a:fld id="{AA480DD2-C9B7-48D0-9853-63B121350BCC}" type="datetimeFigureOut">
               <a:rPr lang="en-US" smtClean="0"/>
-              <a:t>2/23/2014</a:t>
+              <a:t>4/3/14</a:t>
             </a:fld>
             <a:endParaRPr lang="en-US"/>
           </a:p>
@@ -1603,7 +1603,7 @@
           <a:p>
             <a:fld id="{AA480DD2-C9B7-48D0-9853-63B121350BCC}" type="datetimeFigureOut">
               <a:rPr lang="en-US" smtClean="0"/>
-              <a:t>2/23/2014</a:t>
+              <a:t>4/3/14</a:t>
             </a:fld>
             <a:endParaRPr lang="en-US"/>
           </a:p>
@@ -1721,7 +1721,7 @@
           <a:p>
             <a:fld id="{AA480DD2-C9B7-48D0-9853-63B121350BCC}" type="datetimeFigureOut">
               <a:rPr lang="en-US" smtClean="0"/>
-              <a:t>2/23/2014</a:t>
+              <a:t>4/3/14</a:t>
             </a:fld>
             <a:endParaRPr lang="en-US"/>
           </a:p>
@@ -1816,7 +1816,7 @@
           <a:p>
             <a:fld id="{AA480DD2-C9B7-48D0-9853-63B121350BCC}" type="datetimeFigureOut">
               <a:rPr lang="en-US" smtClean="0"/>
-              <a:t>2/23/2014</a:t>
+              <a:t>4/3/14</a:t>
             </a:fld>
             <a:endParaRPr lang="en-US"/>
           </a:p>
@@ -2093,7 +2093,7 @@
           <a:p>
             <a:fld id="{AA480DD2-C9B7-48D0-9853-63B121350BCC}" type="datetimeFigureOut">
               <a:rPr lang="en-US" smtClean="0"/>
-              <a:t>2/23/2014</a:t>
+              <a:t>4/3/14</a:t>
             </a:fld>
             <a:endParaRPr lang="en-US"/>
           </a:p>
@@ -2346,7 +2346,7 @@
           <a:p>
             <a:fld id="{AA480DD2-C9B7-48D0-9853-63B121350BCC}" type="datetimeFigureOut">
               <a:rPr lang="en-US" smtClean="0"/>
-              <a:t>2/23/2014</a:t>
+              <a:t>4/3/14</a:t>
             </a:fld>
             <a:endParaRPr lang="en-US"/>
           </a:p>
@@ -2559,7 +2559,7 @@
           <a:p>
             <a:fld id="{AA480DD2-C9B7-48D0-9853-63B121350BCC}" type="datetimeFigureOut">
               <a:rPr lang="en-US" smtClean="0"/>
-              <a:t>2/23/2014</a:t>
+              <a:t>4/3/14</a:t>
             </a:fld>
             <a:endParaRPr lang="en-US"/>
           </a:p>
@@ -2985,8 +2985,8 @@
           </a:stretch>
         </p:blipFill>
         <p:spPr>
-          <a:xfrm>
-            <a:off x="1516815" y="0"/>
+          <a:xfrm rot="10800000">
+            <a:off x="1499882" y="0"/>
             <a:ext cx="9144000" cy="6858000"/>
           </a:xfrm>
           <a:prstGeom prst="rect">
@@ -2996,14 +2996,52 @@
       </p:pic>
       <p:sp>
         <p:nvSpPr>
-          <p:cNvPr id="5" name="TextBox 4"/>
-          <p:cNvSpPr txBox="1"/>
+          <p:cNvPr id="2" name="Rectangle 1"/>
+          <p:cNvSpPr/>
           <p:nvPr/>
         </p:nvSpPr>
         <p:spPr>
           <a:xfrm>
-            <a:off x="155158" y="2513568"/>
-            <a:ext cx="825500" cy="1569660"/>
+            <a:off x="4656667" y="0"/>
+            <a:ext cx="2726266" cy="6858000"/>
+          </a:xfrm>
+          <a:prstGeom prst="rect">
+            <a:avLst/>
+          </a:prstGeom>
+        </p:spPr>
+        <p:style>
+          <a:lnRef idx="2">
+            <a:schemeClr val="accent6"/>
+          </a:lnRef>
+          <a:fillRef idx="1">
+            <a:schemeClr val="lt1"/>
+          </a:fillRef>
+          <a:effectRef idx="0">
+            <a:schemeClr val="accent6"/>
+          </a:effectRef>
+          <a:fontRef idx="minor">
+            <a:schemeClr val="dk1"/>
+          </a:fontRef>
+        </p:style>
+        <p:txBody>
+          <a:bodyPr rtlCol="0" anchor="ctr"/>
+          <a:lstStyle/>
+          <a:p>
+            <a:pPr algn="ctr"/>
+            <a:endParaRPr lang="en-US"/>
+          </a:p>
+        </p:txBody>
+      </p:sp>
+      <p:sp>
+        <p:nvSpPr>
+          <p:cNvPr id="3" name="Rectangle 2"/>
+          <p:cNvSpPr/>
+          <p:nvPr/>
+        </p:nvSpPr>
+        <p:spPr>
+          <a:xfrm>
+            <a:off x="4913777" y="461201"/>
+            <a:ext cx="1012890" cy="1862048"/>
           </a:xfrm>
           <a:prstGeom prst="rect">
             <a:avLst/>
@@ -3011,29 +3049,80 @@
           <a:noFill/>
         </p:spPr>
         <p:txBody>
-          <a:bodyPr wrap="square" rtlCol="0">
+          <a:bodyPr wrap="square" lIns="91440" tIns="45720" rIns="91440" bIns="45720">
             <a:spAutoFit/>
           </a:bodyPr>
           <a:lstStyle/>
           <a:p>
-            <a:r>
-              <a:rPr lang="en-US" sz="9600" dirty="0" smtClean="0"/>
-              <a:t>7</a:t>
-            </a:r>
-            <a:endParaRPr lang="en-US" sz="9600" dirty="0"/>
-          </a:p>
-        </p:txBody>
-      </p:sp>
-      <p:sp>
-        <p:nvSpPr>
-          <p:cNvPr id="6" name="TextBox 5"/>
-          <p:cNvSpPr txBox="1"/>
+            <a:pPr algn="ctr"/>
+            <a:r>
+              <a:rPr lang="en-US" sz="11500" b="1" dirty="0">
+                <a:ln w="17780" cmpd="sng">
+                  <a:solidFill>
+                    <a:srgbClr val="FFFFFF"/>
+                  </a:solidFill>
+                  <a:prstDash val="solid"/>
+                  <a:miter lim="800000"/>
+                </a:ln>
+                <a:gradFill rotWithShape="1">
+                  <a:gsLst>
+                    <a:gs pos="0">
+                      <a:srgbClr val="000000">
+                        <a:tint val="92000"/>
+                        <a:shade val="100000"/>
+                        <a:satMod val="150000"/>
+                      </a:srgbClr>
+                    </a:gs>
+                    <a:gs pos="49000">
+                      <a:srgbClr val="000000">
+                        <a:tint val="89000"/>
+                        <a:shade val="90000"/>
+                        <a:satMod val="150000"/>
+                      </a:srgbClr>
+                    </a:gs>
+                    <a:gs pos="50000">
+                      <a:srgbClr val="000000">
+                        <a:tint val="100000"/>
+                        <a:shade val="75000"/>
+                        <a:satMod val="150000"/>
+                      </a:srgbClr>
+                    </a:gs>
+                    <a:gs pos="95000">
+                      <a:srgbClr val="000000">
+                        <a:shade val="47000"/>
+                        <a:satMod val="150000"/>
+                      </a:srgbClr>
+                    </a:gs>
+                    <a:gs pos="100000">
+                      <a:srgbClr val="000000">
+                        <a:shade val="39000"/>
+                        <a:satMod val="150000"/>
+                      </a:srgbClr>
+                    </a:gs>
+                  </a:gsLst>
+                  <a:lin ang="5400000"/>
+                </a:gradFill>
+                <a:effectLst>
+                  <a:outerShdw blurRad="50800" algn="tl" rotWithShape="0">
+                    <a:srgbClr val="000000"/>
+                  </a:outerShdw>
+                </a:effectLst>
+              </a:rPr>
+              <a:t>2</a:t>
+            </a:r>
+          </a:p>
+        </p:txBody>
+      </p:sp>
+      <p:sp>
+        <p:nvSpPr>
+          <p:cNvPr id="8" name="Rectangle 7"/>
+          <p:cNvSpPr/>
           <p:nvPr/>
         </p:nvSpPr>
         <p:spPr>
           <a:xfrm>
-            <a:off x="11196972" y="2513568"/>
-            <a:ext cx="825500" cy="1569660"/>
+            <a:off x="4879910" y="2476269"/>
+            <a:ext cx="1114490" cy="1862048"/>
           </a:xfrm>
           <a:prstGeom prst="rect">
             <a:avLst/>
@@ -3041,16 +3130,553 @@
           <a:noFill/>
         </p:spPr>
         <p:txBody>
-          <a:bodyPr wrap="square" rtlCol="0">
+          <a:bodyPr wrap="square" lIns="91440" tIns="45720" rIns="91440" bIns="45720">
             <a:spAutoFit/>
           </a:bodyPr>
           <a:lstStyle/>
           <a:p>
-            <a:r>
-              <a:rPr lang="en-US" sz="9600" dirty="0"/>
-              <a:t>8</a:t>
-            </a:r>
-            <a:endParaRPr lang="en-US" sz="9600" dirty="0"/>
+            <a:pPr algn="ctr"/>
+            <a:r>
+              <a:rPr lang="en-US" sz="11500" b="1" dirty="0">
+                <a:ln w="17780" cmpd="sng">
+                  <a:solidFill>
+                    <a:srgbClr val="FFFFFF"/>
+                  </a:solidFill>
+                  <a:prstDash val="solid"/>
+                  <a:miter lim="800000"/>
+                </a:ln>
+                <a:gradFill rotWithShape="1">
+                  <a:gsLst>
+                    <a:gs pos="0">
+                      <a:srgbClr val="000000">
+                        <a:tint val="92000"/>
+                        <a:shade val="100000"/>
+                        <a:satMod val="150000"/>
+                      </a:srgbClr>
+                    </a:gs>
+                    <a:gs pos="49000">
+                      <a:srgbClr val="000000">
+                        <a:tint val="89000"/>
+                        <a:shade val="90000"/>
+                        <a:satMod val="150000"/>
+                      </a:srgbClr>
+                    </a:gs>
+                    <a:gs pos="50000">
+                      <a:srgbClr val="000000">
+                        <a:tint val="100000"/>
+                        <a:shade val="75000"/>
+                        <a:satMod val="150000"/>
+                      </a:srgbClr>
+                    </a:gs>
+                    <a:gs pos="95000">
+                      <a:srgbClr val="000000">
+                        <a:shade val="47000"/>
+                        <a:satMod val="150000"/>
+                      </a:srgbClr>
+                    </a:gs>
+                    <a:gs pos="100000">
+                      <a:srgbClr val="000000">
+                        <a:shade val="39000"/>
+                        <a:satMod val="150000"/>
+                      </a:srgbClr>
+                    </a:gs>
+                  </a:gsLst>
+                  <a:lin ang="5400000"/>
+                </a:gradFill>
+                <a:effectLst>
+                  <a:outerShdw blurRad="50800" algn="tl" rotWithShape="0">
+                    <a:srgbClr val="000000"/>
+                  </a:outerShdw>
+                </a:effectLst>
+              </a:rPr>
+              <a:t>1</a:t>
+            </a:r>
+          </a:p>
+        </p:txBody>
+      </p:sp>
+      <p:sp>
+        <p:nvSpPr>
+          <p:cNvPr id="10" name="Rectangle 9"/>
+          <p:cNvSpPr/>
+          <p:nvPr/>
+        </p:nvSpPr>
+        <p:spPr>
+          <a:xfrm>
+            <a:off x="4862976" y="4626805"/>
+            <a:ext cx="1182224" cy="1862048"/>
+          </a:xfrm>
+          <a:prstGeom prst="rect">
+            <a:avLst/>
+          </a:prstGeom>
+          <a:noFill/>
+        </p:spPr>
+        <p:txBody>
+          <a:bodyPr wrap="square" lIns="91440" tIns="45720" rIns="91440" bIns="45720">
+            <a:spAutoFit/>
+          </a:bodyPr>
+          <a:lstStyle/>
+          <a:p>
+            <a:pPr algn="ctr"/>
+            <a:r>
+              <a:rPr lang="en-US" sz="11500" b="1" dirty="0">
+                <a:ln w="17780" cmpd="sng">
+                  <a:solidFill>
+                    <a:srgbClr val="FFFFFF"/>
+                  </a:solidFill>
+                  <a:prstDash val="solid"/>
+                  <a:miter lim="800000"/>
+                </a:ln>
+                <a:gradFill rotWithShape="1">
+                  <a:gsLst>
+                    <a:gs pos="0">
+                      <a:srgbClr val="000000">
+                        <a:tint val="92000"/>
+                        <a:shade val="100000"/>
+                        <a:satMod val="150000"/>
+                      </a:srgbClr>
+                    </a:gs>
+                    <a:gs pos="49000">
+                      <a:srgbClr val="000000">
+                        <a:tint val="89000"/>
+                        <a:shade val="90000"/>
+                        <a:satMod val="150000"/>
+                      </a:srgbClr>
+                    </a:gs>
+                    <a:gs pos="50000">
+                      <a:srgbClr val="000000">
+                        <a:tint val="100000"/>
+                        <a:shade val="75000"/>
+                        <a:satMod val="150000"/>
+                      </a:srgbClr>
+                    </a:gs>
+                    <a:gs pos="95000">
+                      <a:srgbClr val="000000">
+                        <a:shade val="47000"/>
+                        <a:satMod val="150000"/>
+                      </a:srgbClr>
+                    </a:gs>
+                    <a:gs pos="100000">
+                      <a:srgbClr val="000000">
+                        <a:shade val="39000"/>
+                        <a:satMod val="150000"/>
+                      </a:srgbClr>
+                    </a:gs>
+                  </a:gsLst>
+                  <a:lin ang="5400000"/>
+                </a:gradFill>
+                <a:effectLst>
+                  <a:outerShdw blurRad="50800" algn="tl" rotWithShape="0">
+                    <a:srgbClr val="000000"/>
+                  </a:outerShdw>
+                </a:effectLst>
+              </a:rPr>
+              <a:t>2</a:t>
+            </a:r>
+          </a:p>
+        </p:txBody>
+      </p:sp>
+      <p:sp>
+        <p:nvSpPr>
+          <p:cNvPr id="11" name="Rectangle 10"/>
+          <p:cNvSpPr/>
+          <p:nvPr/>
+        </p:nvSpPr>
+        <p:spPr>
+          <a:xfrm>
+            <a:off x="6251510" y="495068"/>
+            <a:ext cx="1012890" cy="1862048"/>
+          </a:xfrm>
+          <a:prstGeom prst="rect">
+            <a:avLst/>
+          </a:prstGeom>
+          <a:noFill/>
+        </p:spPr>
+        <p:txBody>
+          <a:bodyPr wrap="square" lIns="91440" tIns="45720" rIns="91440" bIns="45720">
+            <a:spAutoFit/>
+          </a:bodyPr>
+          <a:lstStyle/>
+          <a:p>
+            <a:pPr algn="ctr"/>
+            <a:r>
+              <a:rPr lang="en-US" sz="11500" b="1" dirty="0">
+                <a:ln w="17780" cmpd="sng">
+                  <a:solidFill>
+                    <a:srgbClr val="FFFFFF"/>
+                  </a:solidFill>
+                  <a:prstDash val="solid"/>
+                  <a:miter lim="800000"/>
+                </a:ln>
+                <a:gradFill rotWithShape="1">
+                  <a:gsLst>
+                    <a:gs pos="0">
+                      <a:srgbClr val="000000">
+                        <a:tint val="92000"/>
+                        <a:shade val="100000"/>
+                        <a:satMod val="150000"/>
+                      </a:srgbClr>
+                    </a:gs>
+                    <a:gs pos="49000">
+                      <a:srgbClr val="000000">
+                        <a:tint val="89000"/>
+                        <a:shade val="90000"/>
+                        <a:satMod val="150000"/>
+                      </a:srgbClr>
+                    </a:gs>
+                    <a:gs pos="50000">
+                      <a:srgbClr val="000000">
+                        <a:tint val="100000"/>
+                        <a:shade val="75000"/>
+                        <a:satMod val="150000"/>
+                      </a:srgbClr>
+                    </a:gs>
+                    <a:gs pos="95000">
+                      <a:srgbClr val="000000">
+                        <a:shade val="47000"/>
+                        <a:satMod val="150000"/>
+                      </a:srgbClr>
+                    </a:gs>
+                    <a:gs pos="100000">
+                      <a:srgbClr val="000000">
+                        <a:shade val="39000"/>
+                        <a:satMod val="150000"/>
+                      </a:srgbClr>
+                    </a:gs>
+                  </a:gsLst>
+                  <a:lin ang="5400000"/>
+                </a:gradFill>
+                <a:effectLst>
+                  <a:outerShdw blurRad="50800" algn="tl" rotWithShape="0">
+                    <a:srgbClr val="000000"/>
+                  </a:outerShdw>
+                </a:effectLst>
+              </a:rPr>
+              <a:t>2</a:t>
+            </a:r>
+          </a:p>
+        </p:txBody>
+      </p:sp>
+      <p:sp>
+        <p:nvSpPr>
+          <p:cNvPr id="12" name="Rectangle 11"/>
+          <p:cNvSpPr/>
+          <p:nvPr/>
+        </p:nvSpPr>
+        <p:spPr>
+          <a:xfrm>
+            <a:off x="6183776" y="2476271"/>
+            <a:ext cx="1114490" cy="1862048"/>
+          </a:xfrm>
+          <a:prstGeom prst="rect">
+            <a:avLst/>
+          </a:prstGeom>
+          <a:noFill/>
+        </p:spPr>
+        <p:txBody>
+          <a:bodyPr wrap="square" lIns="91440" tIns="45720" rIns="91440" bIns="45720">
+            <a:spAutoFit/>
+          </a:bodyPr>
+          <a:lstStyle/>
+          <a:p>
+            <a:pPr algn="ctr"/>
+            <a:r>
+              <a:rPr lang="en-US" sz="11500" b="1" dirty="0">
+                <a:ln w="17780" cmpd="sng">
+                  <a:solidFill>
+                    <a:srgbClr val="FFFFFF"/>
+                  </a:solidFill>
+                  <a:prstDash val="solid"/>
+                  <a:miter lim="800000"/>
+                </a:ln>
+                <a:gradFill rotWithShape="1">
+                  <a:gsLst>
+                    <a:gs pos="0">
+                      <a:srgbClr val="000000">
+                        <a:tint val="92000"/>
+                        <a:shade val="100000"/>
+                        <a:satMod val="150000"/>
+                      </a:srgbClr>
+                    </a:gs>
+                    <a:gs pos="49000">
+                      <a:srgbClr val="000000">
+                        <a:tint val="89000"/>
+                        <a:shade val="90000"/>
+                        <a:satMod val="150000"/>
+                      </a:srgbClr>
+                    </a:gs>
+                    <a:gs pos="50000">
+                      <a:srgbClr val="000000">
+                        <a:tint val="100000"/>
+                        <a:shade val="75000"/>
+                        <a:satMod val="150000"/>
+                      </a:srgbClr>
+                    </a:gs>
+                    <a:gs pos="95000">
+                      <a:srgbClr val="000000">
+                        <a:shade val="47000"/>
+                        <a:satMod val="150000"/>
+                      </a:srgbClr>
+                    </a:gs>
+                    <a:gs pos="100000">
+                      <a:srgbClr val="000000">
+                        <a:shade val="39000"/>
+                        <a:satMod val="150000"/>
+                      </a:srgbClr>
+                    </a:gs>
+                  </a:gsLst>
+                  <a:lin ang="5400000"/>
+                </a:gradFill>
+                <a:effectLst>
+                  <a:outerShdw blurRad="50800" algn="tl" rotWithShape="0">
+                    <a:srgbClr val="000000"/>
+                  </a:outerShdw>
+                </a:effectLst>
+              </a:rPr>
+              <a:t>1</a:t>
+            </a:r>
+          </a:p>
+        </p:txBody>
+      </p:sp>
+      <p:sp>
+        <p:nvSpPr>
+          <p:cNvPr id="13" name="Rectangle 12"/>
+          <p:cNvSpPr/>
+          <p:nvPr/>
+        </p:nvSpPr>
+        <p:spPr>
+          <a:xfrm>
+            <a:off x="6166843" y="4660673"/>
+            <a:ext cx="1182224" cy="1862048"/>
+          </a:xfrm>
+          <a:prstGeom prst="rect">
+            <a:avLst/>
+          </a:prstGeom>
+          <a:noFill/>
+        </p:spPr>
+        <p:txBody>
+          <a:bodyPr wrap="square" lIns="91440" tIns="45720" rIns="91440" bIns="45720">
+            <a:spAutoFit/>
+          </a:bodyPr>
+          <a:lstStyle/>
+          <a:p>
+            <a:pPr algn="ctr"/>
+            <a:r>
+              <a:rPr lang="en-US" sz="11500" b="1" dirty="0">
+                <a:ln w="17780" cmpd="sng">
+                  <a:solidFill>
+                    <a:srgbClr val="FFFFFF"/>
+                  </a:solidFill>
+                  <a:prstDash val="solid"/>
+                  <a:miter lim="800000"/>
+                </a:ln>
+                <a:gradFill rotWithShape="1">
+                  <a:gsLst>
+                    <a:gs pos="0">
+                      <a:srgbClr val="000000">
+                        <a:tint val="92000"/>
+                        <a:shade val="100000"/>
+                        <a:satMod val="150000"/>
+                      </a:srgbClr>
+                    </a:gs>
+                    <a:gs pos="49000">
+                      <a:srgbClr val="000000">
+                        <a:tint val="89000"/>
+                        <a:shade val="90000"/>
+                        <a:satMod val="150000"/>
+                      </a:srgbClr>
+                    </a:gs>
+                    <a:gs pos="50000">
+                      <a:srgbClr val="000000">
+                        <a:tint val="100000"/>
+                        <a:shade val="75000"/>
+                        <a:satMod val="150000"/>
+                      </a:srgbClr>
+                    </a:gs>
+                    <a:gs pos="95000">
+                      <a:srgbClr val="000000">
+                        <a:shade val="47000"/>
+                        <a:satMod val="150000"/>
+                      </a:srgbClr>
+                    </a:gs>
+                    <a:gs pos="100000">
+                      <a:srgbClr val="000000">
+                        <a:shade val="39000"/>
+                        <a:satMod val="150000"/>
+                      </a:srgbClr>
+                    </a:gs>
+                  </a:gsLst>
+                  <a:lin ang="5400000"/>
+                </a:gradFill>
+                <a:effectLst>
+                  <a:outerShdw blurRad="50800" algn="tl" rotWithShape="0">
+                    <a:srgbClr val="000000"/>
+                  </a:outerShdw>
+                </a:effectLst>
+              </a:rPr>
+              <a:t>2</a:t>
+            </a:r>
+          </a:p>
+        </p:txBody>
+      </p:sp>
+      <p:sp>
+        <p:nvSpPr>
+          <p:cNvPr id="14" name="Rectangle 13"/>
+          <p:cNvSpPr/>
+          <p:nvPr/>
+        </p:nvSpPr>
+        <p:spPr>
+          <a:xfrm>
+            <a:off x="10823511" y="2493206"/>
+            <a:ext cx="1182224" cy="1862048"/>
+          </a:xfrm>
+          <a:prstGeom prst="rect">
+            <a:avLst/>
+          </a:prstGeom>
+          <a:noFill/>
+        </p:spPr>
+        <p:txBody>
+          <a:bodyPr wrap="square" lIns="91440" tIns="45720" rIns="91440" bIns="45720">
+            <a:spAutoFit/>
+          </a:bodyPr>
+          <a:lstStyle/>
+          <a:p>
+            <a:pPr algn="ctr"/>
+            <a:r>
+              <a:rPr lang="en-US" sz="11500" b="1" dirty="0">
+                <a:ln w="17780" cmpd="sng">
+                  <a:solidFill>
+                    <a:srgbClr val="FFFFFF"/>
+                  </a:solidFill>
+                  <a:prstDash val="solid"/>
+                  <a:miter lim="800000"/>
+                </a:ln>
+                <a:gradFill rotWithShape="1">
+                  <a:gsLst>
+                    <a:gs pos="0">
+                      <a:srgbClr val="000000">
+                        <a:tint val="92000"/>
+                        <a:shade val="100000"/>
+                        <a:satMod val="150000"/>
+                      </a:srgbClr>
+                    </a:gs>
+                    <a:gs pos="49000">
+                      <a:srgbClr val="000000">
+                        <a:tint val="89000"/>
+                        <a:shade val="90000"/>
+                        <a:satMod val="150000"/>
+                      </a:srgbClr>
+                    </a:gs>
+                    <a:gs pos="50000">
+                      <a:srgbClr val="000000">
+                        <a:tint val="100000"/>
+                        <a:shade val="75000"/>
+                        <a:satMod val="150000"/>
+                      </a:srgbClr>
+                    </a:gs>
+                    <a:gs pos="95000">
+                      <a:srgbClr val="000000">
+                        <a:shade val="47000"/>
+                        <a:satMod val="150000"/>
+                      </a:srgbClr>
+                    </a:gs>
+                    <a:gs pos="100000">
+                      <a:srgbClr val="000000">
+                        <a:shade val="39000"/>
+                        <a:satMod val="150000"/>
+                      </a:srgbClr>
+                    </a:gs>
+                  </a:gsLst>
+                  <a:lin ang="5400000"/>
+                </a:gradFill>
+                <a:effectLst>
+                  <a:outerShdw blurRad="50800" algn="tl" rotWithShape="0">
+                    <a:srgbClr val="000000"/>
+                  </a:outerShdw>
+                </a:effectLst>
+              </a:rPr>
+              <a:t>3</a:t>
+            </a:r>
+          </a:p>
+        </p:txBody>
+      </p:sp>
+      <p:sp>
+        <p:nvSpPr>
+          <p:cNvPr id="15" name="Rectangle 14"/>
+          <p:cNvSpPr/>
+          <p:nvPr/>
+        </p:nvSpPr>
+        <p:spPr>
+          <a:xfrm>
+            <a:off x="121643" y="2476272"/>
+            <a:ext cx="1182224" cy="1862048"/>
+          </a:xfrm>
+          <a:prstGeom prst="rect">
+            <a:avLst/>
+          </a:prstGeom>
+          <a:noFill/>
+        </p:spPr>
+        <p:txBody>
+          <a:bodyPr wrap="square" lIns="91440" tIns="45720" rIns="91440" bIns="45720">
+            <a:spAutoFit/>
+          </a:bodyPr>
+          <a:lstStyle/>
+          <a:p>
+            <a:pPr algn="ctr"/>
+            <a:r>
+              <a:rPr lang="en-US" sz="11500" b="1" dirty="0">
+                <a:ln w="17780" cmpd="sng">
+                  <a:solidFill>
+                    <a:srgbClr val="FFFFFF"/>
+                  </a:solidFill>
+                  <a:prstDash val="solid"/>
+                  <a:miter lim="800000"/>
+                </a:ln>
+                <a:gradFill rotWithShape="1">
+                  <a:gsLst>
+                    <a:gs pos="0">
+                      <a:srgbClr val="000000">
+                        <a:tint val="92000"/>
+                        <a:shade val="100000"/>
+                        <a:satMod val="150000"/>
+                      </a:srgbClr>
+                    </a:gs>
+                    <a:gs pos="49000">
+                      <a:srgbClr val="000000">
+                        <a:tint val="89000"/>
+                        <a:shade val="90000"/>
+                        <a:satMod val="150000"/>
+                      </a:srgbClr>
+                    </a:gs>
+                    <a:gs pos="50000">
+                      <a:srgbClr val="000000">
+                        <a:tint val="100000"/>
+                        <a:shade val="75000"/>
+                        <a:satMod val="150000"/>
+                      </a:srgbClr>
+                    </a:gs>
+                    <a:gs pos="95000">
+                      <a:srgbClr val="000000">
+                        <a:shade val="47000"/>
+                        <a:satMod val="150000"/>
+                      </a:srgbClr>
+                    </a:gs>
+                    <a:gs pos="100000">
+                      <a:srgbClr val="000000">
+                        <a:shade val="39000"/>
+                        <a:satMod val="150000"/>
+                      </a:srgbClr>
+                    </a:gs>
+                  </a:gsLst>
+                  <a:lin ang="5400000"/>
+                </a:gradFill>
+                <a:effectLst>
+                  <a:outerShdw blurRad="50800" algn="tl" rotWithShape="0">
+                    <a:srgbClr val="000000"/>
+                  </a:outerShdw>
+                </a:effectLst>
+              </a:rPr>
+              <a:t>3</a:t>
+            </a:r>
           </a:p>
         </p:txBody>
       </p:sp>
@@ -3110,7 +3736,7 @@
     </a:clrScheme>
     <a:fontScheme name="Office">
       <a:majorFont>
-        <a:latin typeface="Calibri Light" panose="020F0302020204030204"/>
+        <a:latin typeface="Calibri Light"/>
         <a:ea typeface=""/>
         <a:cs typeface=""/>
         <a:font script="Jpan" typeface="ＭＳ Ｐゴシック"/>
@@ -3145,7 +3771,7 @@
         <a:font script="Geor" typeface="Sylfaen"/>
       </a:majorFont>
       <a:minorFont>
-        <a:latin typeface="Calibri" panose="020F0502020204030204"/>
+        <a:latin typeface="Calibri"/>
         <a:ea typeface=""/>
         <a:cs typeface=""/>
         <a:font script="Jpan" typeface="ＭＳ Ｐゴシック"/>
@@ -3322,7 +3948,7 @@
   <a:extraClrSchemeLst/>
   <a:extLst>
     <a:ext uri="{05A4C25C-085E-4340-85A3-A5531E510DB2}">
-      <thm15:themeFamily xmlns:thm15="http://schemas.microsoft.com/office/thememl/2012/main" name="Office Theme" id="{62F939B6-93AF-4DB8-9C6B-D6C7DFDC589F}" vid="{4A3C46E8-61CC-4603-A589-7422A47A8E4A}"/>
+      <thm15:themeFamily xmlns:thm15="http://schemas.microsoft.com/office/thememl/2012/main" xmlns="" name="Office Theme" id="{62F939B6-93AF-4DB8-9C6B-D6C7DFDC589F}" vid="{4A3C46E8-61CC-4603-A589-7422A47A8E4A}"/>
     </a:ext>
   </a:extLst>
 </a:theme>

</xml_diff>